<commit_message>
lecture 18, pagerank etc
</commit_message>
<xml_diff>
--- a/slides/WSTA_L18_web_graph.pptx
+++ b/slides/WSTA_L18_web_graph.pptx
@@ -221,7 +221,7 @@
           <a:p>
             <a:fld id="{50A97A5B-EA5E-9E4E-B952-F7E0D0C1A3D8}" type="datetimeFigureOut">
               <a:rPr lang="en-US" smtClean="0"/>
-              <a:t>5/5/17</a:t>
+              <a:t>5/8/17</a:t>
             </a:fld>
             <a:endParaRPr lang="en-US"/>
           </a:p>
@@ -751,6 +751,90 @@
     <p:extLst>
       <p:ext uri="{BB962C8B-B14F-4D97-AF65-F5344CB8AC3E}">
         <p14:creationId xmlns:p14="http://schemas.microsoft.com/office/powerpoint/2010/main" val="972641667"/>
+      </p:ext>
+    </p:extLst>
+  </p:cSld>
+  <p:clrMapOvr>
+    <a:masterClrMapping/>
+  </p:clrMapOvr>
+</p:notes>
+</file>
+
+<file path=ppt/notesSlides/notesSlide4.xml><?xml version="1.0" encoding="utf-8"?>
+<p:notes xmlns:a="http://schemas.openxmlformats.org/drawingml/2006/main" xmlns:r="http://schemas.openxmlformats.org/officeDocument/2006/relationships" xmlns:p="http://schemas.openxmlformats.org/presentationml/2006/main">
+  <p:cSld>
+    <p:spTree>
+      <p:nvGrpSpPr>
+        <p:cNvPr id="1" name=""/>
+        <p:cNvGrpSpPr/>
+        <p:nvPr/>
+      </p:nvGrpSpPr>
+      <p:grpSpPr>
+        <a:xfrm>
+          <a:off x="0" y="0"/>
+          <a:ext cx="0" cy="0"/>
+          <a:chOff x="0" y="0"/>
+          <a:chExt cx="0" cy="0"/>
+        </a:xfrm>
+      </p:grpSpPr>
+      <p:sp>
+        <p:nvSpPr>
+          <p:cNvPr id="2" name="Slide Image Placeholder 1"/>
+          <p:cNvSpPr>
+            <a:spLocks noGrp="1" noRot="1" noChangeAspect="1"/>
+          </p:cNvSpPr>
+          <p:nvPr>
+            <p:ph type="sldImg"/>
+          </p:nvPr>
+        </p:nvSpPr>
+        <p:spPr/>
+      </p:sp>
+      <p:sp>
+        <p:nvSpPr>
+          <p:cNvPr id="3" name="Notes Placeholder 2"/>
+          <p:cNvSpPr>
+            <a:spLocks noGrp="1"/>
+          </p:cNvSpPr>
+          <p:nvPr>
+            <p:ph type="body" idx="1"/>
+          </p:nvPr>
+        </p:nvSpPr>
+        <p:spPr/>
+        <p:txBody>
+          <a:bodyPr/>
+          <a:lstStyle/>
+          <a:p>
+            <a:endParaRPr lang="en-AU" dirty="0"/>
+          </a:p>
+        </p:txBody>
+      </p:sp>
+      <p:sp>
+        <p:nvSpPr>
+          <p:cNvPr id="4" name="Slide Number Placeholder 3"/>
+          <p:cNvSpPr>
+            <a:spLocks noGrp="1"/>
+          </p:cNvSpPr>
+          <p:nvPr>
+            <p:ph type="sldNum" sz="quarter" idx="10"/>
+          </p:nvPr>
+        </p:nvSpPr>
+        <p:spPr/>
+        <p:txBody>
+          <a:bodyPr/>
+          <a:lstStyle/>
+          <a:p>
+            <a:fld id="{EB142DFD-E891-9644-AE8A-31EC826A325E}" type="slidenum">
+              <a:rPr lang="en-US" smtClean="0"/>
+              <a:t>25</a:t>
+            </a:fld>
+            <a:endParaRPr lang="en-US"/>
+          </a:p>
+        </p:txBody>
+      </p:sp>
+    </p:spTree>
+    <p:extLst>
+      <p:ext uri="{BB962C8B-B14F-4D97-AF65-F5344CB8AC3E}">
+        <p14:creationId xmlns:p14="http://schemas.microsoft.com/office/powerpoint/2010/main" val="958258460"/>
       </p:ext>
     </p:extLst>
   </p:cSld>
@@ -4120,17 +4204,12 @@
           <a:p>
             <a:r>
               <a:rPr lang="en-US" dirty="0" smtClean="0"/>
-              <a:t>comp90042 lecture </a:t>
-            </a:r>
-            <a:r>
-              <a:rPr lang="en-US" dirty="0" smtClean="0"/>
-              <a:t>1</a:t>
+              <a:t>comp90042 lecture 1</a:t>
             </a:r>
             <a:r>
               <a:rPr lang="en-US" dirty="0"/>
               <a:t>8</a:t>
             </a:r>
-            <a:endParaRPr lang="en-US" dirty="0"/>
           </a:p>
         </p:txBody>
       </p:sp>
@@ -5366,6 +5445,14 @@
           </a:p>
           <a:p>
             <a:r>
+              <a:rPr lang="en-US" dirty="0" smtClean="0">
+                <a:solidFill>
+                  <a:srgbClr val="FF0000"/>
+                </a:solidFill>
+              </a:rPr>
+              <a:t>[</a:t>
+            </a:r>
+            <a:r>
               <a:rPr lang="en-US" b="1" dirty="0" smtClean="0">
                 <a:solidFill>
                   <a:srgbClr val="FF0000"/>
@@ -5374,16 +5461,20 @@
               <a:t>JFF</a:t>
             </a:r>
             <a:r>
-              <a:rPr lang="en-US" b="1" dirty="0">
+              <a:rPr lang="en-US" dirty="0">
                 <a:solidFill>
                   <a:srgbClr val="FF0000"/>
                 </a:solidFill>
               </a:rPr>
-              <a:t>:</a:t>
+              <a:t>]</a:t>
             </a:r>
             <a:r>
               <a:rPr lang="en-US" dirty="0" smtClean="0"/>
-              <a:t> When </a:t>
+              <a:t> </a:t>
+            </a:r>
+            <a:r>
+              <a:rPr lang="en-US" dirty="0" smtClean="0"/>
+              <a:t>When </a:t>
             </a:r>
             <a:r>
               <a:rPr lang="en-US" dirty="0"/>
@@ -6720,11 +6811,7 @@
             </a:r>
             <a:r>
               <a:rPr lang="en-US" dirty="0" smtClean="0"/>
-              <a:t>prefer one </a:t>
-            </a:r>
-            <a:r>
-              <a:rPr lang="en-US" dirty="0" smtClean="0"/>
-              <a:t>type or </a:t>
+              <a:t>prefer one type or </a:t>
             </a:r>
             <a:r>
               <a:rPr lang="en-US" dirty="0"/>
@@ -8226,7 +8313,12 @@
             <p:ph type="body" idx="1"/>
           </p:nvPr>
         </p:nvSpPr>
-        <p:spPr/>
+        <p:spPr>
+          <a:xfrm>
+            <a:off x="187524" y="1160859"/>
+            <a:ext cx="8572500" cy="5188570"/>
+          </a:xfrm>
+        </p:spPr>
         <p:txBody>
           <a:bodyPr>
             <a:normAutofit lnSpcReduction="10000"/>
@@ -8239,18 +8331,21 @@
             </a:r>
           </a:p>
           <a:p>
+            <a:pPr lvl="1"/>
             <a:r>
               <a:rPr lang="en-AU" dirty="0" smtClean="0"/>
               <a:t>PageRank models a random surfer in the limit, with Markov Chain</a:t>
             </a:r>
           </a:p>
           <a:p>
+            <a:pPr lvl="1"/>
             <a:r>
               <a:rPr lang="en-AU" dirty="0" smtClean="0"/>
               <a:t>HITS models hub and authority status of pages</a:t>
             </a:r>
           </a:p>
           <a:p>
+            <a:pPr lvl="1"/>
             <a:r>
               <a:rPr lang="en-AU" dirty="0" smtClean="0"/>
               <a:t>Both solved for steady-state using iteration/linear algebra</a:t>

</xml_diff>